<commit_message>
Aggiunta mia matricola nella presentazione
</commit_message>
<xml_diff>
--- a/Group_21 (Bozza OttaM).pptx
+++ b/Group_21 (Bozza OttaM).pptx
@@ -107,6 +107,22 @@
       </a:defRPr>
     </a:lvl9pPr>
   </p:defaultTextStyle>
+  <p:extLst>
+    <p:ext uri="{EFAFB233-063F-42B5-8137-9DF3F51BA10A}">
+      <p15:sldGuideLst xmlns:p15="http://schemas.microsoft.com/office/powerpoint/2012/main">
+        <p15:guide id="1" orient="horz" pos="2160">
+          <p15:clr>
+            <a:srgbClr val="A4A3A4"/>
+          </p15:clr>
+        </p15:guide>
+        <p15:guide id="2" pos="2880">
+          <p15:clr>
+            <a:srgbClr val="A4A3A4"/>
+          </p15:clr>
+        </p15:guide>
+      </p15:sldGuideLst>
+    </p:ext>
+  </p:extLst>
 </p:presentation>
 </file>
 
@@ -5146,19 +5162,7 @@
                 <a:latin typeface="Cambria Math" pitchFamily="18" charset="0"/>
                 <a:ea typeface="Cambria Math" pitchFamily="18" charset="0"/>
               </a:rPr>
-              <a:t>A solver for VRPTW and Fixed Fleet size </a:t>
-            </a:r>
-            <a:r>
-              <a:rPr lang="en-US" altLang="it-IT" sz="2800" dirty="0" smtClean="0">
-                <a:solidFill>
-                  <a:schemeClr val="accent2">
-                    <a:lumMod val="75000"/>
-                  </a:schemeClr>
-                </a:solidFill>
-                <a:latin typeface="Cambria Math" pitchFamily="18" charset="0"/>
-                <a:ea typeface="Cambria Math" pitchFamily="18" charset="0"/>
-              </a:rPr>
-              <a:t>VRPTW</a:t>
+              <a:t>A solver for VRPTW and Fixed Fleet size VRPTW</a:t>
             </a:r>
           </a:p>
           <a:p>
@@ -5197,18 +5201,6 @@
               <a:buNone/>
             </a:pPr>
             <a:r>
-              <a:rPr lang="en-US" altLang="it-IT" sz="1600" dirty="0" smtClean="0">
-                <a:solidFill>
-                  <a:schemeClr val="accent2">
-                    <a:lumMod val="75000"/>
-                  </a:schemeClr>
-                </a:solidFill>
-                <a:latin typeface="Cambria Math" pitchFamily="18" charset="0"/>
-                <a:ea typeface="Cambria Math" pitchFamily="18" charset="0"/>
-              </a:rPr>
-              <a:t>Michele </a:t>
-            </a:r>
-            <a:r>
               <a:rPr lang="en-US" altLang="it-IT" sz="1600" dirty="0" err="1" smtClean="0">
                 <a:solidFill>
                   <a:schemeClr val="accent2">
@@ -5220,6 +5212,18 @@
               </a:rPr>
               <a:t>Ottaviano</a:t>
             </a:r>
+            <a:r>
+              <a:rPr lang="en-US" altLang="it-IT" sz="1600" dirty="0" smtClean="0">
+                <a:solidFill>
+                  <a:schemeClr val="accent2">
+                    <a:lumMod val="75000"/>
+                  </a:schemeClr>
+                </a:solidFill>
+                <a:latin typeface="Cambria Math" pitchFamily="18" charset="0"/>
+                <a:ea typeface="Cambria Math" pitchFamily="18" charset="0"/>
+              </a:rPr>
+              <a:t> Michele</a:t>
+            </a:r>
             <a:endParaRPr lang="en-US" altLang="it-IT" sz="1600" dirty="0" smtClean="0">
               <a:solidFill>
                 <a:schemeClr val="accent2">
@@ -5244,19 +5248,7 @@
                 <a:latin typeface="Cambria Math" pitchFamily="18" charset="0"/>
                 <a:ea typeface="Cambria Math" pitchFamily="18" charset="0"/>
               </a:rPr>
-              <a:t>De </a:t>
-            </a:r>
-            <a:r>
-              <a:rPr lang="it-IT" sz="1600" dirty="0" err="1" smtClean="0">
-                <a:solidFill>
-                  <a:schemeClr val="accent2">
-                    <a:lumMod val="75000"/>
-                  </a:schemeClr>
-                </a:solidFill>
-                <a:latin typeface="Cambria Math" pitchFamily="18" charset="0"/>
-                <a:ea typeface="Cambria Math" pitchFamily="18" charset="0"/>
-              </a:rPr>
-              <a:t>Francisci</a:t>
+              <a:t>De Francisci </a:t>
             </a:r>
             <a:r>
               <a:rPr lang="it-IT" sz="1600" dirty="0" smtClean="0">
@@ -5268,8 +5260,17 @@
                 <a:latin typeface="Cambria Math" pitchFamily="18" charset="0"/>
                 <a:ea typeface="Cambria Math" pitchFamily="18" charset="0"/>
               </a:rPr>
-              <a:t> Alessio </a:t>
-            </a:r>
+              <a:t>Alessio 220493 </a:t>
+            </a:r>
+            <a:endParaRPr lang="it-IT" sz="1600" dirty="0" smtClean="0">
+              <a:solidFill>
+                <a:schemeClr val="accent2">
+                  <a:lumMod val="75000"/>
+                </a:schemeClr>
+              </a:solidFill>
+              <a:latin typeface="Cambria Math" pitchFamily="18" charset="0"/>
+              <a:ea typeface="Cambria Math" pitchFamily="18" charset="0"/>
+            </a:endParaRPr>
           </a:p>
           <a:p>
             <a:pPr algn="ctr">
@@ -5287,15 +5288,6 @@
               </a:rPr>
               <a:t>Leone Rosario</a:t>
             </a:r>
-            <a:endParaRPr lang="it-IT" sz="1600" dirty="0" smtClean="0">
-              <a:solidFill>
-                <a:schemeClr val="accent2">
-                  <a:lumMod val="75000"/>
-                </a:schemeClr>
-              </a:solidFill>
-              <a:latin typeface="Cambria Math" pitchFamily="18" charset="0"/>
-              <a:ea typeface="Cambria Math" pitchFamily="18" charset="0"/>
-            </a:endParaRPr>
           </a:p>
           <a:p>
             <a:pPr algn="ctr">
@@ -5335,45 +5327,7 @@
                 <a:latin typeface="Cambria Math" pitchFamily="18" charset="0"/>
                 <a:ea typeface="Cambria Math" pitchFamily="18" charset="0"/>
               </a:rPr>
-              <a:t> </a:t>
-            </a:r>
-            <a:r>
-              <a:rPr lang="it-IT" sz="1600" dirty="0" smtClean="0">
-                <a:solidFill>
-                  <a:schemeClr val="accent2">
-                    <a:lumMod val="75000"/>
-                  </a:schemeClr>
-                </a:solidFill>
-                <a:latin typeface="Cambria Math" pitchFamily="18" charset="0"/>
-                <a:ea typeface="Cambria Math" pitchFamily="18" charset="0"/>
-              </a:rPr>
-              <a:t>Paolo</a:t>
-            </a:r>
-            <a:endParaRPr lang="it-IT" sz="1600" dirty="0" smtClean="0">
-              <a:solidFill>
-                <a:schemeClr val="accent2">
-                  <a:lumMod val="75000"/>
-                </a:schemeClr>
-              </a:solidFill>
-              <a:latin typeface="Cambria Math" pitchFamily="18" charset="0"/>
-              <a:ea typeface="Cambria Math" pitchFamily="18" charset="0"/>
-            </a:endParaRPr>
-          </a:p>
-          <a:p>
-            <a:pPr algn="ctr">
-              <a:buNone/>
-            </a:pPr>
-            <a:r>
-              <a:rPr lang="it-IT" sz="1600" dirty="0" smtClean="0">
-                <a:solidFill>
-                  <a:schemeClr val="accent2">
-                    <a:lumMod val="75000"/>
-                  </a:schemeClr>
-                </a:solidFill>
-                <a:latin typeface="Cambria Math" pitchFamily="18" charset="0"/>
-                <a:ea typeface="Cambria Math" pitchFamily="18" charset="0"/>
-              </a:rPr>
-              <a:t>Popov Valentin</a:t>
+              <a:t> Paolo</a:t>
             </a:r>
           </a:p>
           <a:p>
@@ -5403,6 +5357,35 @@
                 <a:ea typeface="Cambria Math" pitchFamily="18" charset="0"/>
               </a:rPr>
               <a:t> Daniele</a:t>
+            </a:r>
+          </a:p>
+          <a:p>
+            <a:pPr algn="ctr">
+              <a:buNone/>
+            </a:pPr>
+            <a:r>
+              <a:rPr lang="it-IT" sz="1600" dirty="0">
+                <a:solidFill>
+                  <a:schemeClr val="accent2">
+                    <a:lumMod val="75000"/>
+                  </a:schemeClr>
+                </a:solidFill>
+                <a:latin typeface="Cambria Math" pitchFamily="18" charset="0"/>
+                <a:ea typeface="Cambria Math" pitchFamily="18" charset="0"/>
+              </a:rPr>
+              <a:t>Popov </a:t>
+            </a:r>
+            <a:r>
+              <a:rPr lang="it-IT" sz="1600" dirty="0" smtClean="0">
+                <a:solidFill>
+                  <a:schemeClr val="accent2">
+                    <a:lumMod val="75000"/>
+                  </a:schemeClr>
+                </a:solidFill>
+                <a:latin typeface="Cambria Math" pitchFamily="18" charset="0"/>
+                <a:ea typeface="Cambria Math" pitchFamily="18" charset="0"/>
+              </a:rPr>
+              <a:t>Valentin</a:t>
             </a:r>
             <a:endParaRPr lang="en-US" altLang="it-IT" sz="1600" dirty="0" smtClean="0">
               <a:solidFill>
@@ -5672,11 +5655,7 @@
           <a:p>
             <a:r>
               <a:rPr lang="it-IT" dirty="0" smtClean="0"/>
-              <a:t>VRPTW </a:t>
-            </a:r>
-            <a:r>
-              <a:rPr lang="it-IT" dirty="0" smtClean="0"/>
-              <a:t>SOLVER</a:t>
+              <a:t>VRPTW SOLVER</a:t>
             </a:r>
             <a:br>
               <a:rPr lang="it-IT" dirty="0" smtClean="0"/>

</xml_diff>

<commit_message>
Aggiunti al ppt dettagli su modifiche al livello 2
</commit_message>
<xml_diff>
--- a/Group_21 (Bozza OttaM).pptx
+++ b/Group_21 (Bozza OttaM).pptx
@@ -9,6 +9,7 @@
     <p:sldId id="257" r:id="rId3"/>
     <p:sldId id="258" r:id="rId4"/>
     <p:sldId id="259" r:id="rId5"/>
+    <p:sldId id="260" r:id="rId6"/>
   </p:sldIdLst>
   <p:sldSz cx="9144000" cy="6858000" type="screen4x3"/>
   <p:notesSz cx="6858000" cy="9144000"/>
@@ -264,7 +265,7 @@
             <a:fld id="{4B6055F8-1D02-4417-9241-55C834FD9970}" type="datetimeFigureOut">
               <a:rPr lang="it-IT" smtClean="0"/>
               <a:pPr/>
-              <a:t>04/01/2016</a:t>
+              <a:t>05/01/2016</a:t>
             </a:fld>
             <a:endParaRPr lang="it-IT"/>
           </a:p>
@@ -1135,7 +1136,7 @@
             <a:fld id="{4B6055F8-1D02-4417-9241-55C834FD9970}" type="datetimeFigureOut">
               <a:rPr lang="it-IT" smtClean="0"/>
               <a:pPr/>
-              <a:t>04/01/2016</a:t>
+              <a:t>05/01/2016</a:t>
             </a:fld>
             <a:endParaRPr lang="it-IT"/>
           </a:p>
@@ -1312,7 +1313,7 @@
             <a:fld id="{4B6055F8-1D02-4417-9241-55C834FD9970}" type="datetimeFigureOut">
               <a:rPr lang="it-IT" smtClean="0"/>
               <a:pPr/>
-              <a:t>04/01/2016</a:t>
+              <a:t>05/01/2016</a:t>
             </a:fld>
             <a:endParaRPr lang="it-IT"/>
           </a:p>
@@ -1484,7 +1485,7 @@
             <a:fld id="{4B6055F8-1D02-4417-9241-55C834FD9970}" type="datetimeFigureOut">
               <a:rPr lang="it-IT" smtClean="0"/>
               <a:pPr/>
-              <a:t>04/01/2016</a:t>
+              <a:t>05/01/2016</a:t>
             </a:fld>
             <a:endParaRPr lang="it-IT"/>
           </a:p>
@@ -1696,7 +1697,7 @@
             <a:fld id="{4B6055F8-1D02-4417-9241-55C834FD9970}" type="datetimeFigureOut">
               <a:rPr lang="it-IT" smtClean="0"/>
               <a:pPr/>
-              <a:t>04/01/2016</a:t>
+              <a:t>05/01/2016</a:t>
             </a:fld>
             <a:endParaRPr lang="it-IT"/>
           </a:p>
@@ -2512,7 +2513,7 @@
             <a:fld id="{4B6055F8-1D02-4417-9241-55C834FD9970}" type="datetimeFigureOut">
               <a:rPr lang="it-IT" smtClean="0"/>
               <a:pPr/>
-              <a:t>04/01/2016</a:t>
+              <a:t>05/01/2016</a:t>
             </a:fld>
             <a:endParaRPr lang="it-IT"/>
           </a:p>
@@ -2750,7 +2751,7 @@
             <a:fld id="{4B6055F8-1D02-4417-9241-55C834FD9970}" type="datetimeFigureOut">
               <a:rPr lang="it-IT" smtClean="0"/>
               <a:pPr/>
-              <a:t>04/01/2016</a:t>
+              <a:t>05/01/2016</a:t>
             </a:fld>
             <a:endParaRPr lang="it-IT"/>
           </a:p>
@@ -3075,7 +3076,7 @@
             <a:fld id="{4B6055F8-1D02-4417-9241-55C834FD9970}" type="datetimeFigureOut">
               <a:rPr lang="it-IT" smtClean="0"/>
               <a:pPr/>
-              <a:t>04/01/2016</a:t>
+              <a:t>05/01/2016</a:t>
             </a:fld>
             <a:endParaRPr lang="it-IT"/>
           </a:p>
@@ -3167,7 +3168,7 @@
             <a:fld id="{4B6055F8-1D02-4417-9241-55C834FD9970}" type="datetimeFigureOut">
               <a:rPr lang="it-IT" smtClean="0"/>
               <a:pPr/>
-              <a:t>04/01/2016</a:t>
+              <a:t>05/01/2016</a:t>
             </a:fld>
             <a:endParaRPr lang="it-IT"/>
           </a:p>
@@ -3686,7 +3687,7 @@
             <a:fld id="{4B6055F8-1D02-4417-9241-55C834FD9970}" type="datetimeFigureOut">
               <a:rPr lang="it-IT" smtClean="0"/>
               <a:pPr/>
-              <a:t>04/01/2016</a:t>
+              <a:t>05/01/2016</a:t>
             </a:fld>
             <a:endParaRPr lang="it-IT"/>
           </a:p>
@@ -4199,7 +4200,7 @@
             <a:fld id="{4B6055F8-1D02-4417-9241-55C834FD9970}" type="datetimeFigureOut">
               <a:rPr lang="it-IT" smtClean="0"/>
               <a:pPr/>
-              <a:t>04/01/2016</a:t>
+              <a:t>05/01/2016</a:t>
             </a:fld>
             <a:endParaRPr lang="it-IT"/>
           </a:p>
@@ -4446,7 +4447,7 @@
             <a:fld id="{4B6055F8-1D02-4417-9241-55C834FD9970}" type="datetimeFigureOut">
               <a:rPr lang="it-IT" smtClean="0"/>
               <a:pPr/>
-              <a:t>04/01/2016</a:t>
+              <a:t>05/01/2016</a:t>
             </a:fld>
             <a:endParaRPr lang="it-IT"/>
           </a:p>
@@ -5224,15 +5225,6 @@
               </a:rPr>
               <a:t> Michele</a:t>
             </a:r>
-            <a:endParaRPr lang="en-US" altLang="it-IT" sz="1600" dirty="0" smtClean="0">
-              <a:solidFill>
-                <a:schemeClr val="accent2">
-                  <a:lumMod val="75000"/>
-                </a:schemeClr>
-              </a:solidFill>
-              <a:latin typeface="Cambria Math" pitchFamily="18" charset="0"/>
-              <a:ea typeface="Cambria Math" pitchFamily="18" charset="0"/>
-            </a:endParaRPr>
           </a:p>
           <a:p>
             <a:pPr algn="ctr">
@@ -5248,29 +5240,8 @@
                 <a:latin typeface="Cambria Math" pitchFamily="18" charset="0"/>
                 <a:ea typeface="Cambria Math" pitchFamily="18" charset="0"/>
               </a:rPr>
-              <a:t>De Francisci </a:t>
-            </a:r>
-            <a:r>
-              <a:rPr lang="it-IT" sz="1600" dirty="0" smtClean="0">
-                <a:solidFill>
-                  <a:schemeClr val="accent2">
-                    <a:lumMod val="75000"/>
-                  </a:schemeClr>
-                </a:solidFill>
-                <a:latin typeface="Cambria Math" pitchFamily="18" charset="0"/>
-                <a:ea typeface="Cambria Math" pitchFamily="18" charset="0"/>
-              </a:rPr>
-              <a:t>Alessio 220493 </a:t>
-            </a:r>
-            <a:endParaRPr lang="it-IT" sz="1600" dirty="0" smtClean="0">
-              <a:solidFill>
-                <a:schemeClr val="accent2">
-                  <a:lumMod val="75000"/>
-                </a:schemeClr>
-              </a:solidFill>
-              <a:latin typeface="Cambria Math" pitchFamily="18" charset="0"/>
-              <a:ea typeface="Cambria Math" pitchFamily="18" charset="0"/>
-            </a:endParaRPr>
+              <a:t>De Francisci Alessio 220493 </a:t>
+            </a:r>
           </a:p>
           <a:p>
             <a:pPr algn="ctr">
@@ -5335,18 +5306,6 @@
               <a:buNone/>
             </a:pPr>
             <a:r>
-              <a:rPr lang="it-IT" altLang="it-IT" sz="1600" dirty="0" err="1" smtClean="0">
-                <a:solidFill>
-                  <a:schemeClr val="accent2">
-                    <a:lumMod val="75000"/>
-                  </a:schemeClr>
-                </a:solidFill>
-                <a:latin typeface="Cambria Math" pitchFamily="18" charset="0"/>
-                <a:ea typeface="Cambria Math" pitchFamily="18" charset="0"/>
-              </a:rPr>
-              <a:t>Pellone</a:t>
-            </a:r>
-            <a:r>
               <a:rPr lang="it-IT" altLang="it-IT" sz="1600" dirty="0" smtClean="0">
                 <a:solidFill>
                   <a:schemeClr val="accent2">
@@ -5356,8 +5315,29 @@
                 <a:latin typeface="Cambria Math" pitchFamily="18" charset="0"/>
                 <a:ea typeface="Cambria Math" pitchFamily="18" charset="0"/>
               </a:rPr>
-              <a:t> Daniele</a:t>
-            </a:r>
+              <a:t>Pellone </a:t>
+            </a:r>
+            <a:r>
+              <a:rPr lang="it-IT" altLang="it-IT" sz="1600" dirty="0" smtClean="0">
+                <a:solidFill>
+                  <a:schemeClr val="accent2">
+                    <a:lumMod val="75000"/>
+                  </a:schemeClr>
+                </a:solidFill>
+                <a:latin typeface="Cambria Math" pitchFamily="18" charset="0"/>
+                <a:ea typeface="Cambria Math" pitchFamily="18" charset="0"/>
+              </a:rPr>
+              <a:t>Daniele 231853</a:t>
+            </a:r>
+            <a:endParaRPr lang="it-IT" altLang="it-IT" sz="1600" dirty="0" smtClean="0">
+              <a:solidFill>
+                <a:schemeClr val="accent2">
+                  <a:lumMod val="75000"/>
+                </a:schemeClr>
+              </a:solidFill>
+              <a:latin typeface="Cambria Math" pitchFamily="18" charset="0"/>
+              <a:ea typeface="Cambria Math" pitchFamily="18" charset="0"/>
+            </a:endParaRPr>
           </a:p>
           <a:p>
             <a:pPr algn="ctr">
@@ -5696,85 +5676,48 @@
               <a:buAutoNum type="arabicPeriod"/>
             </a:pPr>
             <a:r>
-              <a:rPr lang="it-IT" dirty="0" err="1" smtClean="0"/>
-              <a:t>Probability</a:t>
-            </a:r>
-            <a:r>
-              <a:rPr lang="it-IT" dirty="0" smtClean="0"/>
-              <a:t> </a:t>
-            </a:r>
-            <a:r>
-              <a:rPr lang="it-IT" dirty="0" err="1" smtClean="0"/>
-              <a:t>of</a:t>
-            </a:r>
-            <a:r>
-              <a:rPr lang="it-IT" dirty="0" smtClean="0"/>
-              <a:t> 30% :</a:t>
+              <a:rPr lang="en-US" dirty="0" smtClean="0"/>
+              <a:t>Probability of 30% :</a:t>
             </a:r>
           </a:p>
           <a:p>
             <a:pPr marL="822960" lvl="1" indent="-457200"/>
             <a:r>
-              <a:rPr lang="it-IT" dirty="0" err="1" smtClean="0"/>
-              <a:t>Select</a:t>
-            </a:r>
-            <a:r>
-              <a:rPr lang="it-IT" dirty="0" smtClean="0"/>
-              <a:t> Best</a:t>
+              <a:rPr lang="en-US" dirty="0" smtClean="0"/>
+              <a:t>Select Best</a:t>
             </a:r>
           </a:p>
           <a:p>
             <a:pPr marL="822960" lvl="1" indent="-457200"/>
             <a:r>
-              <a:rPr lang="it-IT" dirty="0" err="1" smtClean="0"/>
-              <a:t>Greedy</a:t>
-            </a:r>
-            <a:r>
-              <a:rPr lang="it-IT" dirty="0" smtClean="0"/>
-              <a:t> </a:t>
-            </a:r>
-            <a:r>
-              <a:rPr lang="it-IT" dirty="0" err="1" smtClean="0"/>
-              <a:t>Acceptance</a:t>
-            </a:r>
-            <a:endParaRPr lang="it-IT" dirty="0" smtClean="0"/>
+              <a:rPr lang="en-US" dirty="0" smtClean="0"/>
+              <a:t>Greedy Acceptance</a:t>
+            </a:r>
           </a:p>
           <a:p>
             <a:pPr marL="822960" lvl="1" indent="-457200"/>
             <a:r>
-              <a:rPr lang="it-IT" dirty="0" err="1" smtClean="0"/>
-              <a:t>Random</a:t>
-            </a:r>
-            <a:r>
-              <a:rPr lang="it-IT" dirty="0" smtClean="0"/>
-              <a:t> </a:t>
-            </a:r>
-            <a:r>
-              <a:rPr lang="it-IT" dirty="0" err="1" smtClean="0"/>
-              <a:t>Ruin</a:t>
-            </a:r>
-            <a:r>
-              <a:rPr lang="it-IT" dirty="0" smtClean="0"/>
-              <a:t> </a:t>
-            </a:r>
-            <a:r>
-              <a:rPr lang="it-IT" sz="1600" dirty="0" smtClean="0"/>
+              <a:rPr lang="en-US" dirty="0" smtClean="0"/>
+              <a:t>Random Ruin </a:t>
+            </a:r>
+            <a:r>
+              <a:rPr lang="en-US" sz="1600" dirty="0" smtClean="0"/>
               <a:t>(30%)</a:t>
             </a:r>
           </a:p>
           <a:p>
             <a:pPr marL="822960" lvl="1" indent="-457200"/>
             <a:r>
-              <a:rPr lang="it-IT" dirty="0" err="1" smtClean="0"/>
+              <a:rPr lang="en-US" dirty="0" err="1" smtClean="0"/>
               <a:t>BestInsertion</a:t>
             </a:r>
-            <a:endParaRPr lang="it-IT" dirty="0" smtClean="0"/>
+            <a:endParaRPr lang="en-US" dirty="0" smtClean="0"/>
           </a:p>
           <a:p>
             <a:pPr marL="457200" indent="-457200">
               <a:buNone/>
             </a:pPr>
-            <a:endParaRPr lang="it-IT" dirty="0" smtClean="0"/>
+            <a:endParaRPr lang="en-US" dirty="0" smtClean="0"/>
           </a:p>
           <a:p>
             <a:pPr marL="457200" indent="-457200">
@@ -5782,119 +5725,62 @@
               <a:buAutoNum type="arabicPeriod" startAt="2"/>
             </a:pPr>
             <a:r>
-              <a:rPr lang="it-IT" dirty="0" err="1" smtClean="0"/>
-              <a:t>Probability</a:t>
-            </a:r>
-            <a:r>
-              <a:rPr lang="it-IT" dirty="0" smtClean="0"/>
-              <a:t> </a:t>
-            </a:r>
-            <a:r>
-              <a:rPr lang="it-IT" dirty="0" err="1" smtClean="0"/>
-              <a:t>of</a:t>
-            </a:r>
-            <a:r>
-              <a:rPr lang="it-IT" dirty="0" smtClean="0"/>
-              <a:t> 70% :</a:t>
+              <a:rPr lang="en-US" dirty="0" smtClean="0"/>
+              <a:t>Probability of 70% :</a:t>
             </a:r>
           </a:p>
           <a:p>
             <a:pPr marL="822960" lvl="1" indent="-457200"/>
             <a:r>
-              <a:rPr lang="it-IT" dirty="0" err="1" smtClean="0"/>
+              <a:rPr lang="en-US" dirty="0" err="1" smtClean="0"/>
               <a:t>SelectRandomly</a:t>
             </a:r>
-            <a:endParaRPr lang="it-IT" dirty="0" smtClean="0"/>
+            <a:endParaRPr lang="en-US" dirty="0" smtClean="0"/>
           </a:p>
           <a:p>
             <a:pPr marL="822960" lvl="1" indent="-457200"/>
             <a:r>
-              <a:rPr lang="it-IT" dirty="0" err="1" smtClean="0"/>
+              <a:rPr lang="en-US" dirty="0" err="1" smtClean="0"/>
               <a:t>Schrimpf</a:t>
             </a:r>
             <a:r>
-              <a:rPr lang="it-IT" dirty="0" smtClean="0"/>
-              <a:t> </a:t>
-            </a:r>
-            <a:r>
-              <a:rPr lang="it-IT" dirty="0" err="1" smtClean="0"/>
-              <a:t>Acceptance</a:t>
-            </a:r>
-            <a:r>
-              <a:rPr lang="it-IT" dirty="0" smtClean="0"/>
-              <a:t> </a:t>
-            </a:r>
-            <a:r>
-              <a:rPr lang="it-IT" sz="1600" dirty="0" smtClean="0"/>
-              <a:t>(</a:t>
-            </a:r>
-            <a:r>
-              <a:rPr lang="it-IT" sz="1600" dirty="0" err="1" smtClean="0"/>
-              <a:t>Alpha</a:t>
-            </a:r>
-            <a:r>
-              <a:rPr lang="it-IT" sz="1600" dirty="0" smtClean="0"/>
-              <a:t> = 0.2 , </a:t>
-            </a:r>
-            <a:r>
-              <a:rPr lang="it-IT" sz="1600" dirty="0" err="1" smtClean="0"/>
-              <a:t>Initial</a:t>
-            </a:r>
-            <a:r>
-              <a:rPr lang="it-IT" sz="1600" dirty="0" smtClean="0"/>
-              <a:t> </a:t>
-            </a:r>
-            <a:r>
-              <a:rPr lang="it-IT" sz="1600" dirty="0" err="1" smtClean="0"/>
+              <a:rPr lang="en-US" dirty="0" smtClean="0"/>
+              <a:t> Acceptance </a:t>
+            </a:r>
+            <a:r>
+              <a:rPr lang="en-US" sz="1600" dirty="0" smtClean="0"/>
+              <a:t>(Alpha = 0.2 , Initial </a:t>
+            </a:r>
+            <a:r>
+              <a:rPr lang="en-US" sz="1600" dirty="0" err="1" smtClean="0"/>
               <a:t>Treshold</a:t>
             </a:r>
             <a:r>
-              <a:rPr lang="it-IT" sz="1600" dirty="0" smtClean="0"/>
+              <a:rPr lang="en-US" sz="1600" dirty="0" smtClean="0"/>
               <a:t> = 150)</a:t>
             </a:r>
           </a:p>
           <a:p>
             <a:pPr marL="822960" lvl="1" indent="-457200"/>
             <a:r>
-              <a:rPr lang="it-IT" dirty="0" err="1" smtClean="0"/>
-              <a:t>Random</a:t>
-            </a:r>
-            <a:r>
-              <a:rPr lang="it-IT" dirty="0" smtClean="0"/>
-              <a:t> </a:t>
-            </a:r>
-            <a:r>
-              <a:rPr lang="it-IT" dirty="0" err="1" smtClean="0"/>
-              <a:t>Ruin</a:t>
-            </a:r>
-            <a:r>
-              <a:rPr lang="it-IT" dirty="0" smtClean="0"/>
-              <a:t> </a:t>
-            </a:r>
-            <a:r>
-              <a:rPr lang="it-IT" sz="1600" dirty="0" smtClean="0"/>
+              <a:rPr lang="en-US" dirty="0" smtClean="0"/>
+              <a:t>Random Ruin </a:t>
+            </a:r>
+            <a:r>
+              <a:rPr lang="en-US" sz="1600" dirty="0" smtClean="0"/>
               <a:t>(20%)</a:t>
             </a:r>
           </a:p>
           <a:p>
             <a:pPr marL="822960" lvl="1" indent="-457200"/>
             <a:r>
-              <a:rPr lang="it-IT" dirty="0" err="1" smtClean="0"/>
-              <a:t>Regret</a:t>
-            </a:r>
-            <a:r>
-              <a:rPr lang="it-IT" dirty="0" smtClean="0"/>
-              <a:t> </a:t>
-            </a:r>
-            <a:r>
-              <a:rPr lang="it-IT" dirty="0" err="1" smtClean="0"/>
-              <a:t>Insertion</a:t>
-            </a:r>
-            <a:endParaRPr lang="it-IT" dirty="0" smtClean="0"/>
+              <a:rPr lang="en-US" dirty="0" smtClean="0"/>
+              <a:t>Regret Insertion</a:t>
+            </a:r>
           </a:p>
           <a:p>
             <a:pPr marL="822960" lvl="1" indent="-457200"/>
-            <a:endParaRPr lang="it-IT" dirty="0" smtClean="0"/>
+            <a:endParaRPr lang="en-US" dirty="0" smtClean="0"/>
           </a:p>
         </p:txBody>
       </p:sp>
@@ -6029,6 +5915,189 @@
         </p:txBody>
       </p:sp>
     </p:spTree>
+  </p:cSld>
+  <p:clrMapOvr>
+    <a:masterClrMapping/>
+  </p:clrMapOvr>
+</p:sld>
+</file>
+
+<file path=ppt/slides/slide5.xml><?xml version="1.0" encoding="utf-8"?>
+<p:sld xmlns:a="http://schemas.openxmlformats.org/drawingml/2006/main" xmlns:r="http://schemas.openxmlformats.org/officeDocument/2006/relationships" xmlns:p="http://schemas.openxmlformats.org/presentationml/2006/main">
+  <p:cSld>
+    <p:spTree>
+      <p:nvGrpSpPr>
+        <p:cNvPr id="1" name=""/>
+        <p:cNvGrpSpPr/>
+        <p:nvPr/>
+      </p:nvGrpSpPr>
+      <p:grpSpPr>
+        <a:xfrm>
+          <a:off x="0" y="0"/>
+          <a:ext cx="0" cy="0"/>
+          <a:chOff x="0" y="0"/>
+          <a:chExt cx="0" cy="0"/>
+        </a:xfrm>
+      </p:grpSpPr>
+      <p:sp>
+        <p:nvSpPr>
+          <p:cNvPr id="2" name="Titolo 1"/>
+          <p:cNvSpPr>
+            <a:spLocks noGrp="1"/>
+          </p:cNvSpPr>
+          <p:nvPr>
+            <p:ph type="title"/>
+          </p:nvPr>
+        </p:nvSpPr>
+        <p:spPr>
+          <a:xfrm>
+            <a:off x="457200" y="269776"/>
+            <a:ext cx="7467600" cy="1143000"/>
+          </a:xfrm>
+        </p:spPr>
+        <p:txBody>
+          <a:bodyPr/>
+          <a:lstStyle/>
+          <a:p>
+            <a:r>
+              <a:rPr lang="it-IT" dirty="0" smtClean="0"/>
+              <a:t>VRPTW with FIXED FLEET</a:t>
+            </a:r>
+            <a:br>
+              <a:rPr lang="it-IT" dirty="0" smtClean="0"/>
+            </a:br>
+            <a:r>
+              <a:rPr lang="it-IT" dirty="0" smtClean="0"/>
+              <a:t>Solution </a:t>
+            </a:r>
+            <a:r>
+              <a:rPr lang="en-US" dirty="0" smtClean="0"/>
+              <a:t>method</a:t>
+            </a:r>
+            <a:endParaRPr lang="en-US" dirty="0"/>
+          </a:p>
+        </p:txBody>
+      </p:sp>
+      <p:sp>
+        <p:nvSpPr>
+          <p:cNvPr id="3" name="Segnaposto contenuto 2"/>
+          <p:cNvSpPr>
+            <a:spLocks noGrp="1"/>
+          </p:cNvSpPr>
+          <p:nvPr>
+            <p:ph sz="quarter" idx="1"/>
+          </p:nvPr>
+        </p:nvSpPr>
+        <p:spPr/>
+        <p:txBody>
+          <a:bodyPr/>
+          <a:lstStyle/>
+          <a:p>
+            <a:r>
+              <a:rPr lang="en-US" dirty="0" smtClean="0"/>
+              <a:t>Destroy</a:t>
+            </a:r>
+            <a:r>
+              <a:rPr lang="it-IT" dirty="0" smtClean="0"/>
+              <a:t> and </a:t>
+            </a:r>
+            <a:r>
+              <a:rPr lang="en-US" dirty="0" smtClean="0"/>
+              <a:t>Rebuild</a:t>
+            </a:r>
+          </a:p>
+          <a:p>
+            <a:r>
+              <a:rPr lang="en-US" dirty="0" smtClean="0"/>
+              <a:t>Modified Insertion</a:t>
+            </a:r>
+          </a:p>
+          <a:p>
+            <a:pPr lvl="1"/>
+            <a:r>
+              <a:rPr lang="en-US" dirty="0" smtClean="0"/>
+              <a:t>Best Insertion (Concurrent), </a:t>
+            </a:r>
+            <a:r>
+              <a:rPr lang="en-US" dirty="0"/>
+              <a:t>Regret </a:t>
+            </a:r>
+            <a:r>
+              <a:rPr lang="en-US" dirty="0" smtClean="0"/>
+              <a:t>Insertion</a:t>
+            </a:r>
+          </a:p>
+          <a:p>
+            <a:pPr lvl="1"/>
+            <a:r>
+              <a:rPr lang="en-US" i="1" dirty="0" smtClean="0"/>
+              <a:t>Create </a:t>
+            </a:r>
+            <a:r>
+              <a:rPr lang="en-US" i="1" dirty="0"/>
+              <a:t>new routes before to put </a:t>
+            </a:r>
+            <a:r>
+              <a:rPr lang="en-US" i="1" dirty="0" smtClean="0"/>
+              <a:t>customers </a:t>
+            </a:r>
+            <a:r>
+              <a:rPr lang="en-US" i="1" dirty="0"/>
+              <a:t>into existing </a:t>
+            </a:r>
+            <a:r>
+              <a:rPr lang="en-US" i="1" dirty="0" smtClean="0"/>
+              <a:t>ones</a:t>
+            </a:r>
+          </a:p>
+          <a:p>
+            <a:r>
+              <a:rPr lang="en-US" dirty="0" smtClean="0"/>
+              <a:t>Modified Ruin</a:t>
+            </a:r>
+          </a:p>
+          <a:p>
+            <a:pPr lvl="1"/>
+            <a:r>
+              <a:rPr lang="en-US" dirty="0" smtClean="0"/>
+              <a:t>Abstract Ruin</a:t>
+            </a:r>
+          </a:p>
+          <a:p>
+            <a:pPr lvl="1"/>
+            <a:r>
+              <a:rPr lang="en-US" i="1" dirty="0" smtClean="0"/>
+              <a:t>Don’t delete routes with only one customer</a:t>
+            </a:r>
+          </a:p>
+          <a:p>
+            <a:r>
+              <a:rPr lang="en-US" dirty="0" smtClean="0"/>
+              <a:t>New Constraint</a:t>
+            </a:r>
+          </a:p>
+          <a:p>
+            <a:pPr lvl="1"/>
+            <a:r>
+              <a:rPr lang="en-US" dirty="0" smtClean="0"/>
+              <a:t>Balancer Soft Constraint</a:t>
+            </a:r>
+          </a:p>
+          <a:p>
+            <a:pPr lvl="1"/>
+            <a:r>
+              <a:rPr lang="en-US" i="1" dirty="0" smtClean="0"/>
+              <a:t>Reward or penalize insertions based on the number of customers already served by that vehicle</a:t>
+            </a:r>
+          </a:p>
+        </p:txBody>
+      </p:sp>
+    </p:spTree>
+    <p:extLst>
+      <p:ext uri="{BB962C8B-B14F-4D97-AF65-F5344CB8AC3E}">
+        <p14:creationId xmlns:p14="http://schemas.microsoft.com/office/powerpoint/2010/main" val="4008755238"/>
+      </p:ext>
+    </p:extLst>
   </p:cSld>
   <p:clrMapOvr>
     <a:masterClrMapping/>

</xml_diff>